<commit_message>
Refreshed for SQL Saturday Cleveland 2019
</commit_message>
<xml_diff>
--- a/PesterDemo/Pester Your SQL Servers!.pptx
+++ b/PesterDemo/Pester Your SQL Servers!.pptx
@@ -211,7 +211,7 @@
           <a:p>
             <a:fld id="{12882FDC-3987-407E-9FC4-DDE77F4F278E}" type="datetimeFigureOut">
               <a:rPr lang="en-US" smtClean="0"/>
-              <a:t>3/23/2018</a:t>
+              <a:t>1/27/2019</a:t>
             </a:fld>
             <a:endParaRPr lang="en-US"/>
           </a:p>
@@ -963,7 +963,7 @@
           <a:p>
             <a:fld id="{54C0298F-620C-492E-8467-95E20F5A3E19}" type="datetimeFigureOut">
               <a:rPr lang="en-US" smtClean="0"/>
-              <a:t>3/23/2018</a:t>
+              <a:t>1/27/2019</a:t>
             </a:fld>
             <a:endParaRPr lang="en-US"/>
           </a:p>
@@ -1131,7 +1131,7 @@
           <a:p>
             <a:fld id="{54C0298F-620C-492E-8467-95E20F5A3E19}" type="datetimeFigureOut">
               <a:rPr lang="en-US" smtClean="0"/>
-              <a:t>3/23/2018</a:t>
+              <a:t>1/27/2019</a:t>
             </a:fld>
             <a:endParaRPr lang="en-US"/>
           </a:p>
@@ -1309,7 +1309,7 @@
           <a:p>
             <a:fld id="{54C0298F-620C-492E-8467-95E20F5A3E19}" type="datetimeFigureOut">
               <a:rPr lang="en-US" smtClean="0"/>
-              <a:t>3/23/2018</a:t>
+              <a:t>1/27/2019</a:t>
             </a:fld>
             <a:endParaRPr lang="en-US"/>
           </a:p>
@@ -1477,7 +1477,7 @@
           <a:p>
             <a:fld id="{54C0298F-620C-492E-8467-95E20F5A3E19}" type="datetimeFigureOut">
               <a:rPr lang="en-US" smtClean="0"/>
-              <a:t>3/23/2018</a:t>
+              <a:t>1/27/2019</a:t>
             </a:fld>
             <a:endParaRPr lang="en-US"/>
           </a:p>
@@ -1722,7 +1722,7 @@
           <a:p>
             <a:fld id="{54C0298F-620C-492E-8467-95E20F5A3E19}" type="datetimeFigureOut">
               <a:rPr lang="en-US" smtClean="0"/>
-              <a:t>3/23/2018</a:t>
+              <a:t>1/27/2019</a:t>
             </a:fld>
             <a:endParaRPr lang="en-US"/>
           </a:p>
@@ -1951,7 +1951,7 @@
           <a:p>
             <a:fld id="{54C0298F-620C-492E-8467-95E20F5A3E19}" type="datetimeFigureOut">
               <a:rPr lang="en-US" smtClean="0"/>
-              <a:t>3/23/2018</a:t>
+              <a:t>1/27/2019</a:t>
             </a:fld>
             <a:endParaRPr lang="en-US"/>
           </a:p>
@@ -2315,7 +2315,7 @@
           <a:p>
             <a:fld id="{54C0298F-620C-492E-8467-95E20F5A3E19}" type="datetimeFigureOut">
               <a:rPr lang="en-US" smtClean="0"/>
-              <a:t>3/23/2018</a:t>
+              <a:t>1/27/2019</a:t>
             </a:fld>
             <a:endParaRPr lang="en-US"/>
           </a:p>
@@ -2432,7 +2432,7 @@
           <a:p>
             <a:fld id="{54C0298F-620C-492E-8467-95E20F5A3E19}" type="datetimeFigureOut">
               <a:rPr lang="en-US" smtClean="0"/>
-              <a:t>3/23/2018</a:t>
+              <a:t>1/27/2019</a:t>
             </a:fld>
             <a:endParaRPr lang="en-US"/>
           </a:p>
@@ -2527,7 +2527,7 @@
           <a:p>
             <a:fld id="{54C0298F-620C-492E-8467-95E20F5A3E19}" type="datetimeFigureOut">
               <a:rPr lang="en-US" smtClean="0"/>
-              <a:t>3/23/2018</a:t>
+              <a:t>1/27/2019</a:t>
             </a:fld>
             <a:endParaRPr lang="en-US"/>
           </a:p>
@@ -2802,7 +2802,7 @@
           <a:p>
             <a:fld id="{54C0298F-620C-492E-8467-95E20F5A3E19}" type="datetimeFigureOut">
               <a:rPr lang="en-US" smtClean="0"/>
-              <a:t>3/23/2018</a:t>
+              <a:t>1/27/2019</a:t>
             </a:fld>
             <a:endParaRPr lang="en-US"/>
           </a:p>
@@ -3054,7 +3054,7 @@
           <a:p>
             <a:fld id="{54C0298F-620C-492E-8467-95E20F5A3E19}" type="datetimeFigureOut">
               <a:rPr lang="en-US" smtClean="0"/>
-              <a:t>3/23/2018</a:t>
+              <a:t>1/27/2019</a:t>
             </a:fld>
             <a:endParaRPr lang="en-US"/>
           </a:p>
@@ -3265,7 +3265,7 @@
           <a:p>
             <a:fld id="{54C0298F-620C-492E-8467-95E20F5A3E19}" type="datetimeFigureOut">
               <a:rPr lang="en-US" smtClean="0"/>
-              <a:t>3/23/2018</a:t>
+              <a:t>1/27/2019</a:t>
             </a:fld>
             <a:endParaRPr lang="en-US"/>
           </a:p>
@@ -3749,12 +3749,6 @@
             </a:r>
             <a:endParaRPr lang="en-US" dirty="0"/>
           </a:p>
-          <a:p>
-            <a:r>
-              <a:rPr lang="en-US" dirty="0"/>
-              <a:t>SQL Saturday    Rochester, NY</a:t>
-            </a:r>
-          </a:p>
         </p:txBody>
       </p:sp>
     </p:spTree>
@@ -4223,7 +4217,6 @@
               <a:rPr lang="en-US" dirty="0"/>
               <a:t>https://github.com/DexterPOSH/PSRemotely</a:t>
             </a:r>
-            <a:endParaRPr lang="en-US" dirty="0"/>
           </a:p>
           <a:p>
             <a:r>
@@ -5553,12 +5546,6 @@
           <a:p>
             <a:r>
               <a:rPr lang="en-US" dirty="0"/>
-              <a:t>Re-Usable</a:t>
-            </a:r>
-          </a:p>
-          <a:p>
-            <a:r>
-              <a:rPr lang="en-US" dirty="0"/>
               <a:t>Pretty Colors!</a:t>
             </a:r>
           </a:p>
@@ -5807,55 +5794,6 @@
                                           <p:spTgt spid="3">
                                             <p:txEl>
                                               <p:pRg st="4" end="4"/>
-                                            </p:txEl>
-                                          </p:spTgt>
-                                        </p:tgtEl>
-                                        <p:attrNameLst>
-                                          <p:attrName>style.visibility</p:attrName>
-                                        </p:attrNameLst>
-                                      </p:cBhvr>
-                                      <p:to>
-                                        <p:strVal val="visible"/>
-                                      </p:to>
-                                    </p:set>
-                                  </p:childTnLst>
-                                </p:cTn>
-                              </p:par>
-                            </p:childTnLst>
-                          </p:cTn>
-                        </p:par>
-                      </p:childTnLst>
-                    </p:cTn>
-                  </p:par>
-                  <p:par>
-                    <p:cTn id="23" fill="hold">
-                      <p:stCondLst>
-                        <p:cond delay="indefinite"/>
-                      </p:stCondLst>
-                      <p:childTnLst>
-                        <p:par>
-                          <p:cTn id="24" fill="hold">
-                            <p:stCondLst>
-                              <p:cond delay="0"/>
-                            </p:stCondLst>
-                            <p:childTnLst>
-                              <p:par>
-                                <p:cTn id="25" presetID="1" presetClass="entr" presetSubtype="0" fill="hold" grpId="0" nodeType="clickEffect">
-                                  <p:stCondLst>
-                                    <p:cond delay="0"/>
-                                  </p:stCondLst>
-                                  <p:childTnLst>
-                                    <p:set>
-                                      <p:cBhvr>
-                                        <p:cTn id="26" dur="1" fill="hold">
-                                          <p:stCondLst>
-                                            <p:cond delay="0"/>
-                                          </p:stCondLst>
-                                        </p:cTn>
-                                        <p:tgtEl>
-                                          <p:spTgt spid="3">
-                                            <p:txEl>
-                                              <p:pRg st="5" end="5"/>
                                             </p:txEl>
                                           </p:spTgt>
                                         </p:tgtEl>

</xml_diff>